<commit_message>
Prompting, Passing, Command line executions are added
</commit_message>
<xml_diff>
--- a/docs/pytutor.pptx
+++ b/docs/pytutor.pptx
@@ -6,6 +6,12 @@
   </p:sldMasterIdLst>
   <p:sldIdLst>
     <p:sldId id="256" r:id="rId3"/>
+    <p:sldId id="257" r:id="rId4"/>
+    <p:sldId id="258" r:id="rId5"/>
+    <p:sldId id="259" r:id="rId6"/>
+    <p:sldId id="260" r:id="rId7"/>
+    <p:sldId id="261" r:id="rId8"/>
+    <p:sldId id="262" r:id="rId9"/>
   </p:sldIdLst>
   <p:sldSz cx="12192000" cy="6858000"/>
   <p:notesSz cx="6858000" cy="9144000"/>
@@ -16584,6 +16590,423 @@
 </p:sld>
 </file>
 
+<file path=ppt/slides/slide2.xml><?xml version="1.0" encoding="utf-8"?>
+<p:sld xmlns:a="http://schemas.openxmlformats.org/drawingml/2006/main" xmlns:r="http://schemas.openxmlformats.org/officeDocument/2006/relationships" xmlns:p="http://schemas.openxmlformats.org/presentationml/2006/main">
+  <p:cSld>
+    <p:spTree>
+      <p:nvGrpSpPr>
+        <p:cNvPr id="1" name=""/>
+        <p:cNvGrpSpPr/>
+        <p:nvPr/>
+      </p:nvGrpSpPr>
+      <p:grpSpPr/>
+      <p:sp>
+        <p:nvSpPr>
+          <p:cNvPr id="2" name="Title 1"/>
+          <p:cNvSpPr>
+            <a:spLocks noGrp="1"/>
+          </p:cNvSpPr>
+          <p:nvPr>
+            <p:ph type="title"/>
+          </p:nvPr>
+        </p:nvSpPr>
+        <p:spPr/>
+        <p:txBody>
+          <a:bodyPr/>
+          <a:p>
+            <a:r>
+              <a:rPr lang="en-US"/>
+              <a:t>Day-1</a:t>
+            </a:r>
+            <a:endParaRPr lang="en-US"/>
+          </a:p>
+        </p:txBody>
+      </p:sp>
+    </p:spTree>
+  </p:cSld>
+  <p:clrMapOvr>
+    <a:masterClrMapping/>
+  </p:clrMapOvr>
+</p:sld>
+</file>
+
+<file path=ppt/slides/slide3.xml><?xml version="1.0" encoding="utf-8"?>
+<p:sld xmlns:a="http://schemas.openxmlformats.org/drawingml/2006/main" xmlns:r="http://schemas.openxmlformats.org/officeDocument/2006/relationships" xmlns:p="http://schemas.openxmlformats.org/presentationml/2006/main">
+  <p:cSld>
+    <p:spTree>
+      <p:nvGrpSpPr>
+        <p:cNvPr id="1" name=""/>
+        <p:cNvGrpSpPr/>
+        <p:nvPr/>
+      </p:nvGrpSpPr>
+      <p:grpSpPr/>
+      <p:sp>
+        <p:nvSpPr>
+          <p:cNvPr id="2" name="Title 1"/>
+          <p:cNvSpPr>
+            <a:spLocks noGrp="1"/>
+          </p:cNvSpPr>
+          <p:nvPr>
+            <p:ph type="title"/>
+          </p:nvPr>
+        </p:nvSpPr>
+        <p:spPr/>
+        <p:txBody>
+          <a:bodyPr/>
+          <a:p>
+            <a:r>
+              <a:rPr lang="en-US"/>
+              <a:t>kickup</a:t>
+            </a:r>
+            <a:endParaRPr lang="en-US"/>
+          </a:p>
+        </p:txBody>
+      </p:sp>
+      <p:sp>
+        <p:nvSpPr>
+          <p:cNvPr id="3" name="Content Placeholder 2"/>
+          <p:cNvSpPr>
+            <a:spLocks noGrp="1"/>
+          </p:cNvSpPr>
+          <p:nvPr>
+            <p:ph idx="1"/>
+          </p:nvPr>
+        </p:nvSpPr>
+        <p:spPr/>
+        <p:txBody>
+          <a:bodyPr/>
+          <a:p>
+            <a:r>
+              <a:rPr lang="en-US"/>
+              <a:t>Installation &amp; setup</a:t>
+            </a:r>
+            <a:endParaRPr lang="en-US"/>
+          </a:p>
+          <a:p>
+            <a:r>
+              <a:rPr lang="en-US"/>
+              <a:t>Anaconda</a:t>
+            </a:r>
+            <a:endParaRPr lang="en-US"/>
+          </a:p>
+          <a:p>
+            <a:r>
+              <a:rPr lang="en-US"/>
+              <a:t>Spyder</a:t>
+            </a:r>
+            <a:endParaRPr lang="en-US"/>
+          </a:p>
+          <a:p>
+            <a:r>
+              <a:rPr lang="en-US"/>
+              <a:t>Jupyter</a:t>
+            </a:r>
+            <a:endParaRPr lang="en-US"/>
+          </a:p>
+          <a:p>
+            <a:r>
+              <a:rPr lang="en-US"/>
+              <a:t>Helloworld</a:t>
+            </a:r>
+            <a:endParaRPr lang="en-US"/>
+          </a:p>
+          <a:p>
+            <a:endParaRPr lang="en-US"/>
+          </a:p>
+        </p:txBody>
+      </p:sp>
+    </p:spTree>
+  </p:cSld>
+  <p:clrMapOvr>
+    <a:masterClrMapping/>
+  </p:clrMapOvr>
+</p:sld>
+</file>
+
+<file path=ppt/slides/slide4.xml><?xml version="1.0" encoding="utf-8"?>
+<p:sld xmlns:a="http://schemas.openxmlformats.org/drawingml/2006/main" xmlns:r="http://schemas.openxmlformats.org/officeDocument/2006/relationships" xmlns:p="http://schemas.openxmlformats.org/presentationml/2006/main">
+  <p:cSld>
+    <p:spTree>
+      <p:nvGrpSpPr>
+        <p:cNvPr id="1" name=""/>
+        <p:cNvGrpSpPr/>
+        <p:nvPr/>
+      </p:nvGrpSpPr>
+      <p:grpSpPr/>
+      <p:sp>
+        <p:nvSpPr>
+          <p:cNvPr id="2" name="Title 1"/>
+          <p:cNvSpPr>
+            <a:spLocks noGrp="1"/>
+          </p:cNvSpPr>
+          <p:nvPr>
+            <p:ph type="title"/>
+          </p:nvPr>
+        </p:nvSpPr>
+        <p:spPr/>
+        <p:txBody>
+          <a:bodyPr/>
+          <a:p>
+            <a:r>
+              <a:rPr lang="en-US"/>
+              <a:t>Initial usages</a:t>
+            </a:r>
+            <a:endParaRPr lang="en-US"/>
+          </a:p>
+        </p:txBody>
+      </p:sp>
+      <p:sp>
+        <p:nvSpPr>
+          <p:cNvPr id="3" name="Content Placeholder 2"/>
+          <p:cNvSpPr>
+            <a:spLocks noGrp="1"/>
+          </p:cNvSpPr>
+          <p:nvPr>
+            <p:ph idx="1"/>
+          </p:nvPr>
+        </p:nvSpPr>
+        <p:spPr/>
+        <p:txBody>
+          <a:bodyPr/>
+          <a:p>
+            <a:r>
+              <a:rPr lang="en-US"/>
+              <a:t>Comments and Pound character</a:t>
+            </a:r>
+            <a:endParaRPr lang="en-US"/>
+          </a:p>
+          <a:p>
+            <a:r>
+              <a:rPr lang="en-US"/>
+              <a:t>Numbers and Math</a:t>
+            </a:r>
+            <a:endParaRPr lang="en-US"/>
+          </a:p>
+          <a:p>
+            <a:r>
+              <a:rPr lang="en-US"/>
+              <a:t>Variables and Names</a:t>
+            </a:r>
+            <a:endParaRPr lang="en-US"/>
+          </a:p>
+          <a:p>
+            <a:r>
+              <a:rPr lang="en-US"/>
+              <a:t>Variables and Printing</a:t>
+            </a:r>
+            <a:endParaRPr lang="en-US"/>
+          </a:p>
+          <a:p>
+            <a:endParaRPr lang="en-US"/>
+          </a:p>
+        </p:txBody>
+      </p:sp>
+    </p:spTree>
+  </p:cSld>
+  <p:clrMapOvr>
+    <a:masterClrMapping/>
+  </p:clrMapOvr>
+</p:sld>
+</file>
+
+<file path=ppt/slides/slide5.xml><?xml version="1.0" encoding="utf-8"?>
+<p:sld xmlns:a="http://schemas.openxmlformats.org/drawingml/2006/main" xmlns:r="http://schemas.openxmlformats.org/officeDocument/2006/relationships" xmlns:p="http://schemas.openxmlformats.org/presentationml/2006/main">
+  <p:cSld>
+    <p:spTree>
+      <p:nvGrpSpPr>
+        <p:cNvPr id="1" name=""/>
+        <p:cNvGrpSpPr/>
+        <p:nvPr/>
+      </p:nvGrpSpPr>
+      <p:grpSpPr/>
+      <p:sp>
+        <p:nvSpPr>
+          <p:cNvPr id="2" name="Title 1"/>
+          <p:cNvSpPr>
+            <a:spLocks noGrp="1"/>
+          </p:cNvSpPr>
+          <p:nvPr>
+            <p:ph type="title"/>
+          </p:nvPr>
+        </p:nvSpPr>
+        <p:spPr/>
+        <p:txBody>
+          <a:bodyPr/>
+          <a:p>
+            <a:r>
+              <a:rPr lang="en-US"/>
+              <a:t>Day-2</a:t>
+            </a:r>
+            <a:endParaRPr lang="en-US"/>
+          </a:p>
+        </p:txBody>
+      </p:sp>
+    </p:spTree>
+  </p:cSld>
+  <p:clrMapOvr>
+    <a:masterClrMapping/>
+  </p:clrMapOvr>
+</p:sld>
+</file>
+
+<file path=ppt/slides/slide6.xml><?xml version="1.0" encoding="utf-8"?>
+<p:sld xmlns:a="http://schemas.openxmlformats.org/drawingml/2006/main" xmlns:r="http://schemas.openxmlformats.org/officeDocument/2006/relationships" xmlns:p="http://schemas.openxmlformats.org/presentationml/2006/main">
+  <p:cSld>
+    <p:spTree>
+      <p:nvGrpSpPr>
+        <p:cNvPr id="1" name=""/>
+        <p:cNvGrpSpPr/>
+        <p:nvPr/>
+      </p:nvGrpSpPr>
+      <p:grpSpPr/>
+      <p:sp>
+        <p:nvSpPr>
+          <p:cNvPr id="2" name="Title 1"/>
+          <p:cNvSpPr>
+            <a:spLocks noGrp="1"/>
+          </p:cNvSpPr>
+          <p:nvPr>
+            <p:ph type="title"/>
+          </p:nvPr>
+        </p:nvSpPr>
+        <p:spPr/>
+        <p:txBody>
+          <a:bodyPr/>
+          <a:p>
+            <a:r>
+              <a:rPr lang="en-US"/>
+              <a:t>Initial usage contd..</a:t>
+            </a:r>
+            <a:endParaRPr lang="en-US"/>
+          </a:p>
+        </p:txBody>
+      </p:sp>
+      <p:sp>
+        <p:nvSpPr>
+          <p:cNvPr id="3" name="Content Placeholder 2"/>
+          <p:cNvSpPr>
+            <a:spLocks noGrp="1"/>
+          </p:cNvSpPr>
+          <p:nvPr>
+            <p:ph idx="1"/>
+          </p:nvPr>
+        </p:nvSpPr>
+        <p:spPr/>
+        <p:txBody>
+          <a:bodyPr/>
+          <a:p>
+            <a:r>
+              <a:rPr lang="en-US"/>
+              <a:t>strings and text</a:t>
+            </a:r>
+            <a:endParaRPr lang="en-US"/>
+          </a:p>
+          <a:p>
+            <a:r>
+              <a:rPr lang="en-US"/>
+              <a:t>more printing</a:t>
+            </a:r>
+            <a:endParaRPr lang="en-US"/>
+          </a:p>
+          <a:p>
+            <a:r>
+              <a:rPr lang="en-US"/>
+              <a:t>printing, printing</a:t>
+            </a:r>
+            <a:endParaRPr lang="en-US"/>
+          </a:p>
+          <a:p>
+            <a:r>
+              <a:rPr lang="en-US"/>
+              <a:t>printing, printing, printing</a:t>
+            </a:r>
+            <a:endParaRPr lang="en-US"/>
+          </a:p>
+          <a:p>
+            <a:r>
+              <a:rPr lang="en-US"/>
+              <a:t>escape sequences</a:t>
+            </a:r>
+            <a:endParaRPr lang="en-US"/>
+          </a:p>
+          <a:p>
+            <a:r>
+              <a:rPr lang="en-US"/>
+              <a:t>asking questions --- bots</a:t>
+            </a:r>
+            <a:endParaRPr lang="en-US"/>
+          </a:p>
+          <a:p>
+            <a:endParaRPr lang="en-US"/>
+          </a:p>
+        </p:txBody>
+      </p:sp>
+    </p:spTree>
+  </p:cSld>
+  <p:clrMapOvr>
+    <a:masterClrMapping/>
+  </p:clrMapOvr>
+</p:sld>
+</file>
+
+<file path=ppt/slides/slide7.xml><?xml version="1.0" encoding="utf-8"?>
+<p:sld xmlns:a="http://schemas.openxmlformats.org/drawingml/2006/main" xmlns:r="http://schemas.openxmlformats.org/officeDocument/2006/relationships" xmlns:p="http://schemas.openxmlformats.org/presentationml/2006/main">
+  <p:cSld>
+    <p:spTree>
+      <p:nvGrpSpPr>
+        <p:cNvPr id="1" name=""/>
+        <p:cNvGrpSpPr/>
+        <p:nvPr/>
+      </p:nvGrpSpPr>
+      <p:grpSpPr/>
+      <p:sp>
+        <p:nvSpPr>
+          <p:cNvPr id="2" name="Title 1"/>
+          <p:cNvSpPr>
+            <a:spLocks noGrp="1"/>
+          </p:cNvSpPr>
+          <p:nvPr>
+            <p:ph type="title"/>
+          </p:nvPr>
+        </p:nvSpPr>
+        <p:spPr/>
+        <p:txBody>
+          <a:bodyPr/>
+          <a:p>
+            <a:r>
+              <a:rPr lang="en-US"/>
+              <a:t>Day-3</a:t>
+            </a:r>
+            <a:endParaRPr lang="en-US"/>
+          </a:p>
+        </p:txBody>
+      </p:sp>
+      <p:sp>
+        <p:nvSpPr>
+          <p:cNvPr id="3" name="Content Placeholder 2"/>
+          <p:cNvSpPr>
+            <a:spLocks noGrp="1"/>
+          </p:cNvSpPr>
+          <p:nvPr>
+            <p:ph idx="1"/>
+          </p:nvPr>
+        </p:nvSpPr>
+        <p:spPr/>
+        <p:txBody>
+          <a:bodyPr/>
+          <a:p>
+            <a:endParaRPr lang="en-US"/>
+          </a:p>
+        </p:txBody>
+      </p:sp>
+    </p:spTree>
+  </p:cSld>
+  <p:clrMapOvr>
+    <a:masterClrMapping/>
+  </p:clrMapOvr>
+</p:sld>
+</file>
+
 <file path=ppt/theme/theme1.xml><?xml version="1.0" encoding="utf-8"?>
 <a:theme xmlns:a="http://schemas.openxmlformats.org/drawingml/2006/main" name="Art_mountaineering">
   <a:themeElements>

</xml_diff>